<commit_message>
Update Samples and PowerPoint
</commit_message>
<xml_diff>
--- a/Documents/Strahl_FoxProREST.pptx
+++ b/Documents/Strahl_FoxProREST.pptx
@@ -5,15 +5,22 @@
     <p:sldMasterId id="2147483651" r:id="rId1"/>
   </p:sldMasterIdLst>
   <p:notesMasterIdLst>
-    <p:notesMasterId r:id="rId5"/>
+    <p:notesMasterId r:id="rId12"/>
   </p:notesMasterIdLst>
   <p:handoutMasterIdLst>
-    <p:handoutMasterId r:id="rId6"/>
+    <p:handoutMasterId r:id="rId13"/>
   </p:handoutMasterIdLst>
   <p:sldIdLst>
     <p:sldId id="256" r:id="rId2"/>
-    <p:sldId id="281" r:id="rId3"/>
-    <p:sldId id="385" r:id="rId4"/>
+    <p:sldId id="386" r:id="rId3"/>
+    <p:sldId id="387" r:id="rId4"/>
+    <p:sldId id="392" r:id="rId5"/>
+    <p:sldId id="388" r:id="rId6"/>
+    <p:sldId id="390" r:id="rId7"/>
+    <p:sldId id="391" r:id="rId8"/>
+    <p:sldId id="389" r:id="rId9"/>
+    <p:sldId id="281" r:id="rId10"/>
+    <p:sldId id="385" r:id="rId11"/>
   </p:sldIdLst>
   <p:sldSz cx="12192000" cy="6858000"/>
   <p:notesSz cx="6858000" cy="9144000"/>
@@ -1845,12 +1852,17 @@
             <p:ph type="title"/>
           </p:nvPr>
         </p:nvSpPr>
-        <p:spPr/>
+        <p:spPr>
+          <a:xfrm>
+            <a:off x="457200" y="152400"/>
+            <a:ext cx="11430000" cy="457200"/>
+          </a:xfrm>
+        </p:spPr>
         <p:txBody>
           <a:bodyPr/>
           <a:lstStyle>
-            <a:lvl1pPr>
-              <a:defRPr sz="2600"/>
+            <a:lvl1pPr algn="ctr">
+              <a:defRPr sz="2800" baseline="0"/>
             </a:lvl1pPr>
           </a:lstStyle>
           <a:p>
@@ -3244,7 +3256,7 @@
         </p:blipFill>
         <p:spPr bwMode="auto">
           <a:xfrm>
-            <a:off x="11398250" y="314325"/>
+            <a:off x="111125" y="6177121"/>
             <a:ext cx="590550" cy="590550"/>
           </a:xfrm>
           <a:prstGeom prst="rect">
@@ -3935,7 +3947,1970 @@
 </p:sld>
 </file>
 
+<file path=ppt/slides/slide10.xml><?xml version="1.0" encoding="utf-8"?>
+<p:sld xmlns:a="http://schemas.openxmlformats.org/drawingml/2006/main" xmlns:r="http://schemas.openxmlformats.org/officeDocument/2006/relationships" xmlns:p="http://schemas.openxmlformats.org/presentationml/2006/main">
+  <p:cSld>
+    <p:spTree>
+      <p:nvGrpSpPr>
+        <p:cNvPr id="1" name=""/>
+        <p:cNvGrpSpPr/>
+        <p:nvPr/>
+      </p:nvGrpSpPr>
+      <p:grpSpPr>
+        <a:xfrm>
+          <a:off x="0" y="0"/>
+          <a:ext cx="0" cy="0"/>
+          <a:chOff x="0" y="0"/>
+          <a:chExt cx="0" cy="0"/>
+        </a:xfrm>
+      </p:grpSpPr>
+      <p:sp>
+        <p:nvSpPr>
+          <p:cNvPr id="2" name="Text Placeholder 1">
+            <a:extLst>
+              <a:ext uri="{FF2B5EF4-FFF2-40B4-BE49-F238E27FC236}">
+                <a16:creationId xmlns:a16="http://schemas.microsoft.com/office/drawing/2014/main" id="{B848A531-13BD-42AD-A332-33C02482A1C6}"/>
+              </a:ext>
+            </a:extLst>
+          </p:cNvPr>
+          <p:cNvSpPr>
+            <a:spLocks noGrp="1"/>
+          </p:cNvSpPr>
+          <p:nvPr>
+            <p:ph type="body" idx="1"/>
+          </p:nvPr>
+        </p:nvSpPr>
+        <p:spPr/>
+        <p:txBody>
+          <a:bodyPr/>
+          <a:lstStyle/>
+          <a:p>
+            <a:r>
+              <a:rPr lang="en-US"/>
+              <a:t>Resources</a:t>
+            </a:r>
+          </a:p>
+          <a:p>
+            <a:pPr lvl="1"/>
+            <a:r>
+              <a:rPr lang="en-US"/>
+              <a:t>Github: Source Code, White Paper and Slides</a:t>
+            </a:r>
+            <a:br>
+              <a:rPr lang="en-US"/>
+            </a:br>
+            <a:br>
+              <a:rPr lang="en-US" sz="500"/>
+            </a:br>
+            <a:r>
+              <a:rPr lang="en-US" sz="2000">
+                <a:hlinkClick r:id="rId2"/>
+              </a:rPr>
+              <a:t>https://github.com/RickStrahl/SWFOX2019_VueJs</a:t>
+            </a:r>
+            <a:br>
+              <a:rPr lang="en-US"/>
+            </a:br>
+            <a:endParaRPr lang="en-US"/>
+          </a:p>
+          <a:p>
+            <a:r>
+              <a:rPr lang="en-US"/>
+              <a:t>Contact Rick</a:t>
+            </a:r>
+          </a:p>
+          <a:p>
+            <a:pPr lvl="1"/>
+            <a:r>
+              <a:rPr lang="en-US" b="1">
+                <a:hlinkClick r:id="rId3"/>
+              </a:rPr>
+              <a:t>@RickStrahl</a:t>
+            </a:r>
+            <a:r>
+              <a:rPr lang="en-US" b="1"/>
+              <a:t>  on Twitter</a:t>
+            </a:r>
+          </a:p>
+          <a:p>
+            <a:pPr lvl="1"/>
+            <a:r>
+              <a:rPr lang="en-US" b="1">
+                <a:hlinkClick r:id="rId4"/>
+              </a:rPr>
+              <a:t>https://weblog.west-wind.com</a:t>
+            </a:r>
+            <a:endParaRPr lang="en-US" b="1"/>
+          </a:p>
+          <a:p>
+            <a:pPr lvl="1"/>
+            <a:r>
+              <a:rPr lang="en-US" b="1">
+                <a:hlinkClick r:id="rId5"/>
+              </a:rPr>
+              <a:t>https://west-wind.com/wconnect/weblog/</a:t>
+            </a:r>
+            <a:r>
+              <a:rPr lang="en-US" b="1"/>
+              <a:t> </a:t>
+            </a:r>
+          </a:p>
+          <a:p>
+            <a:pPr lvl="1"/>
+            <a:r>
+              <a:rPr lang="en-US" b="1">
+                <a:hlinkClick r:id="rId6"/>
+              </a:rPr>
+              <a:t>rstrahl@west-wind.com</a:t>
+            </a:r>
+            <a:r>
+              <a:rPr lang="en-US" b="1"/>
+              <a:t>	</a:t>
+            </a:r>
+            <a:endParaRPr lang="en-US"/>
+          </a:p>
+          <a:p>
+            <a:pPr marL="457200" lvl="1" indent="0">
+              <a:buNone/>
+            </a:pPr>
+            <a:endParaRPr lang="en-US"/>
+          </a:p>
+        </p:txBody>
+      </p:sp>
+      <p:sp>
+        <p:nvSpPr>
+          <p:cNvPr id="3" name="Title 2">
+            <a:extLst>
+              <a:ext uri="{FF2B5EF4-FFF2-40B4-BE49-F238E27FC236}">
+                <a16:creationId xmlns:a16="http://schemas.microsoft.com/office/drawing/2014/main" id="{DB285E1C-0327-484C-9555-5AF3541A05DD}"/>
+              </a:ext>
+            </a:extLst>
+          </p:cNvPr>
+          <p:cNvSpPr>
+            <a:spLocks noGrp="1"/>
+          </p:cNvSpPr>
+          <p:nvPr>
+            <p:ph type="title"/>
+          </p:nvPr>
+        </p:nvSpPr>
+        <p:spPr/>
+        <p:txBody>
+          <a:bodyPr/>
+          <a:lstStyle/>
+          <a:p>
+            <a:r>
+              <a:rPr lang="en-US"/>
+              <a:t>Thank you!</a:t>
+            </a:r>
+          </a:p>
+        </p:txBody>
+      </p:sp>
+    </p:spTree>
+    <p:extLst>
+      <p:ext uri="{BB962C8B-B14F-4D97-AF65-F5344CB8AC3E}">
+        <p14:creationId xmlns:p14="http://schemas.microsoft.com/office/powerpoint/2010/main" val="144676648"/>
+      </p:ext>
+    </p:extLst>
+  </p:cSld>
+  <p:clrMapOvr>
+    <a:masterClrMapping/>
+  </p:clrMapOvr>
+  <p:transition>
+    <p:wipe/>
+  </p:transition>
+</p:sld>
+</file>
+
 <file path=ppt/slides/slide2.xml><?xml version="1.0" encoding="utf-8"?>
+<p:sld xmlns:a="http://schemas.openxmlformats.org/drawingml/2006/main" xmlns:r="http://schemas.openxmlformats.org/officeDocument/2006/relationships" xmlns:p="http://schemas.openxmlformats.org/presentationml/2006/main">
+  <p:cSld>
+    <p:spTree>
+      <p:nvGrpSpPr>
+        <p:cNvPr id="1" name=""/>
+        <p:cNvGrpSpPr/>
+        <p:nvPr/>
+      </p:nvGrpSpPr>
+      <p:grpSpPr>
+        <a:xfrm>
+          <a:off x="0" y="0"/>
+          <a:ext cx="0" cy="0"/>
+          <a:chOff x="0" y="0"/>
+          <a:chExt cx="0" cy="0"/>
+        </a:xfrm>
+      </p:grpSpPr>
+      <p:sp>
+        <p:nvSpPr>
+          <p:cNvPr id="3" name="Content Placeholder 2">
+            <a:extLst>
+              <a:ext uri="{FF2B5EF4-FFF2-40B4-BE49-F238E27FC236}">
+                <a16:creationId xmlns:a16="http://schemas.microsoft.com/office/drawing/2014/main" id="{9F6D9651-8DCF-4652-BE22-43A8910D4BBD}"/>
+              </a:ext>
+            </a:extLst>
+          </p:cNvPr>
+          <p:cNvSpPr>
+            <a:spLocks noGrp="1"/>
+          </p:cNvSpPr>
+          <p:nvPr>
+            <p:ph idx="1"/>
+          </p:nvPr>
+        </p:nvSpPr>
+        <p:spPr>
+          <a:xfrm>
+            <a:off x="2997200" y="3352800"/>
+            <a:ext cx="6070600" cy="3124200"/>
+          </a:xfrm>
+        </p:spPr>
+        <p:txBody>
+          <a:bodyPr/>
+          <a:lstStyle/>
+          <a:p>
+            <a:r>
+              <a:rPr lang="en-US"/>
+              <a:t>2000</a:t>
+            </a:r>
+          </a:p>
+        </p:txBody>
+      </p:sp>
+      <p:pic>
+        <p:nvPicPr>
+          <p:cNvPr id="1026" name="Picture 2">
+            <a:extLst>
+              <a:ext uri="{FF2B5EF4-FFF2-40B4-BE49-F238E27FC236}">
+                <a16:creationId xmlns:a16="http://schemas.microsoft.com/office/drawing/2014/main" id="{AD1E9093-E878-4FD5-B3A3-6A84ACE26D35}"/>
+              </a:ext>
+            </a:extLst>
+          </p:cNvPr>
+          <p:cNvPicPr>
+            <a:picLocks noChangeAspect="1" noChangeArrowheads="1"/>
+          </p:cNvPicPr>
+          <p:nvPr/>
+        </p:nvPicPr>
+        <p:blipFill>
+          <a:blip r:embed="rId2" cstate="print">
+            <a:extLst>
+              <a:ext uri="{28A0092B-C50C-407E-A947-70E740481C1C}">
+                <a14:useLocalDpi xmlns:a14="http://schemas.microsoft.com/office/drawing/2010/main" val="0"/>
+              </a:ext>
+            </a:extLst>
+          </a:blip>
+          <a:srcRect/>
+          <a:stretch>
+            <a:fillRect/>
+          </a:stretch>
+        </p:blipFill>
+        <p:spPr bwMode="auto">
+          <a:xfrm>
+            <a:off x="3203532" y="1905000"/>
+            <a:ext cx="8991600" cy="4495800"/>
+          </a:xfrm>
+          <a:prstGeom prst="rect">
+            <a:avLst/>
+          </a:prstGeom>
+          <a:noFill/>
+          <a:extLst>
+            <a:ext uri="{909E8E84-426E-40DD-AFC4-6F175D3DCCD1}">
+              <a14:hiddenFill xmlns:a14="http://schemas.microsoft.com/office/drawing/2010/main">
+                <a:solidFill>
+                  <a:srgbClr val="FFFFFF"/>
+                </a:solidFill>
+              </a14:hiddenFill>
+            </a:ext>
+          </a:extLst>
+        </p:spPr>
+      </p:pic>
+      <p:sp>
+        <p:nvSpPr>
+          <p:cNvPr id="5" name="TextBox 4">
+            <a:extLst>
+              <a:ext uri="{FF2B5EF4-FFF2-40B4-BE49-F238E27FC236}">
+                <a16:creationId xmlns:a16="http://schemas.microsoft.com/office/drawing/2014/main" id="{1A17BE96-BBFC-432F-BD43-46F5B5B95C21}"/>
+              </a:ext>
+            </a:extLst>
+          </p:cNvPr>
+          <p:cNvSpPr txBox="1"/>
+          <p:nvPr/>
+        </p:nvSpPr>
+        <p:spPr>
+          <a:xfrm>
+            <a:off x="2832100" y="406392"/>
+            <a:ext cx="6400800" cy="1261884"/>
+          </a:xfrm>
+          <a:prstGeom prst="rect">
+            <a:avLst/>
+          </a:prstGeom>
+          <a:noFill/>
+        </p:spPr>
+        <p:txBody>
+          <a:bodyPr wrap="square" rtlCol="0">
+            <a:spAutoFit/>
+          </a:bodyPr>
+          <a:lstStyle/>
+          <a:p>
+            <a:r>
+              <a:rPr lang="en-US" sz="4800"/>
+              <a:t>REST</a:t>
+            </a:r>
+          </a:p>
+          <a:p>
+            <a:r>
+              <a:rPr lang="en-US" sz="2800"/>
+              <a:t>Representational State Transfer</a:t>
+            </a:r>
+            <a:endParaRPr lang="en-US"/>
+          </a:p>
+        </p:txBody>
+      </p:sp>
+      <p:pic>
+        <p:nvPicPr>
+          <p:cNvPr id="4" name="Picture 3">
+            <a:extLst>
+              <a:ext uri="{FF2B5EF4-FFF2-40B4-BE49-F238E27FC236}">
+                <a16:creationId xmlns:a16="http://schemas.microsoft.com/office/drawing/2014/main" id="{ABF68CBE-4FE9-4E81-8539-2ECBA09BC321}"/>
+              </a:ext>
+            </a:extLst>
+          </p:cNvPr>
+          <p:cNvPicPr>
+            <a:picLocks noChangeAspect="1"/>
+          </p:cNvPicPr>
+          <p:nvPr/>
+        </p:nvPicPr>
+        <p:blipFill>
+          <a:blip r:embed="rId3"/>
+          <a:stretch>
+            <a:fillRect/>
+          </a:stretch>
+        </p:blipFill>
+        <p:spPr>
+          <a:xfrm>
+            <a:off x="27519" y="2438400"/>
+            <a:ext cx="6002742" cy="3352800"/>
+          </a:xfrm>
+          <a:prstGeom prst="rect">
+            <a:avLst/>
+          </a:prstGeom>
+        </p:spPr>
+      </p:pic>
+    </p:spTree>
+    <p:extLst>
+      <p:ext uri="{BB962C8B-B14F-4D97-AF65-F5344CB8AC3E}">
+        <p14:creationId xmlns:p14="http://schemas.microsoft.com/office/powerpoint/2010/main" val="653964499"/>
+      </p:ext>
+    </p:extLst>
+  </p:cSld>
+  <p:clrMapOvr>
+    <a:masterClrMapping/>
+  </p:clrMapOvr>
+  <p:transition>
+    <p:wipe/>
+  </p:transition>
+</p:sld>
+</file>
+
+<file path=ppt/slides/slide3.xml><?xml version="1.0" encoding="utf-8"?>
+<p:sld xmlns:a="http://schemas.openxmlformats.org/drawingml/2006/main" xmlns:r="http://schemas.openxmlformats.org/officeDocument/2006/relationships" xmlns:p="http://schemas.openxmlformats.org/presentationml/2006/main">
+  <p:cSld>
+    <p:spTree>
+      <p:nvGrpSpPr>
+        <p:cNvPr id="1" name=""/>
+        <p:cNvGrpSpPr/>
+        <p:nvPr/>
+      </p:nvGrpSpPr>
+      <p:grpSpPr>
+        <a:xfrm>
+          <a:off x="0" y="0"/>
+          <a:ext cx="0" cy="0"/>
+          <a:chOff x="0" y="0"/>
+          <a:chExt cx="0" cy="0"/>
+        </a:xfrm>
+      </p:grpSpPr>
+      <p:sp>
+        <p:nvSpPr>
+          <p:cNvPr id="2" name="Title 1">
+            <a:extLst>
+              <a:ext uri="{FF2B5EF4-FFF2-40B4-BE49-F238E27FC236}">
+                <a16:creationId xmlns:a16="http://schemas.microsoft.com/office/drawing/2014/main" id="{1F61928F-F32C-4137-86C9-ED69133212FF}"/>
+              </a:ext>
+            </a:extLst>
+          </p:cNvPr>
+          <p:cNvSpPr>
+            <a:spLocks noGrp="1"/>
+          </p:cNvSpPr>
+          <p:nvPr>
+            <p:ph type="title"/>
+          </p:nvPr>
+        </p:nvSpPr>
+        <p:spPr/>
+        <p:txBody>
+          <a:bodyPr/>
+          <a:lstStyle/>
+          <a:p>
+            <a:r>
+              <a:rPr lang="en-US" sz="2000"/>
+              <a:t>Web API Services for the REST of Us</a:t>
+            </a:r>
+          </a:p>
+        </p:txBody>
+      </p:sp>
+      <p:sp>
+        <p:nvSpPr>
+          <p:cNvPr id="3" name="Content Placeholder 2">
+            <a:extLst>
+              <a:ext uri="{FF2B5EF4-FFF2-40B4-BE49-F238E27FC236}">
+                <a16:creationId xmlns:a16="http://schemas.microsoft.com/office/drawing/2014/main" id="{AC81B33A-A5CB-4091-9B2B-433E896AB652}"/>
+              </a:ext>
+            </a:extLst>
+          </p:cNvPr>
+          <p:cNvSpPr>
+            <a:spLocks noGrp="1"/>
+          </p:cNvSpPr>
+          <p:nvPr>
+            <p:ph idx="1"/>
+          </p:nvPr>
+        </p:nvSpPr>
+        <p:spPr>
+          <a:xfrm>
+            <a:off x="152400" y="990600"/>
+            <a:ext cx="5826870" cy="2489200"/>
+          </a:xfrm>
+        </p:spPr>
+        <p:txBody>
+          <a:bodyPr/>
+          <a:lstStyle/>
+          <a:p>
+            <a:r>
+              <a:rPr lang="en-US" sz="1400"/>
+              <a:t>Representational State Transfer</a:t>
+            </a:r>
+          </a:p>
+          <a:p>
+            <a:pPr lvl="1"/>
+            <a:r>
+              <a:rPr lang="en-US" sz="1200"/>
+              <a:t>Huh?</a:t>
+            </a:r>
+          </a:p>
+          <a:p>
+            <a:pPr lvl="1"/>
+            <a:r>
+              <a:rPr lang="en-US" sz="1200"/>
+              <a:t>Representational: Uniform resource access </a:t>
+            </a:r>
+            <a:r>
+              <a:rPr lang="en-US" sz="1050" i="1"/>
+              <a:t>(URL + Verb)</a:t>
+            </a:r>
+            <a:endParaRPr lang="en-US" sz="1200" i="1"/>
+          </a:p>
+          <a:p>
+            <a:pPr lvl="1"/>
+            <a:r>
+              <a:rPr lang="en-US" sz="1200"/>
+              <a:t>State: Data sent between client and server, typically JSON</a:t>
+            </a:r>
+          </a:p>
+          <a:p>
+            <a:pPr lvl="1"/>
+            <a:r>
+              <a:rPr lang="en-US" sz="1200"/>
+              <a:t>Transfer: The HTTP Protocol that carries the data</a:t>
+            </a:r>
+            <a:endParaRPr lang="en-US" sz="1400"/>
+          </a:p>
+          <a:p>
+            <a:r>
+              <a:rPr lang="en-US" sz="1400"/>
+              <a:t>In Simple Terms</a:t>
+            </a:r>
+          </a:p>
+          <a:p>
+            <a:pPr lvl="1"/>
+            <a:r>
+              <a:rPr lang="en-US" sz="1200"/>
+              <a:t>A mechanism to host </a:t>
+            </a:r>
+            <a:r>
+              <a:rPr lang="en-US" sz="1200" b="1"/>
+              <a:t>Web API Services</a:t>
+            </a:r>
+          </a:p>
+          <a:p>
+            <a:pPr lvl="1"/>
+            <a:r>
+              <a:rPr lang="en-US" sz="1200"/>
+              <a:t>Universal access via HTTP from </a:t>
+            </a:r>
+            <a:r>
+              <a:rPr lang="en-US" sz="1200" b="1">
+                <a:solidFill>
+                  <a:srgbClr val="FFFFCC"/>
+                </a:solidFill>
+              </a:rPr>
+              <a:t>anywhere</a:t>
+            </a:r>
+            <a:br>
+              <a:rPr lang="en-US" sz="1200" b="1">
+                <a:solidFill>
+                  <a:srgbClr val="FFFFCC"/>
+                </a:solidFill>
+              </a:rPr>
+            </a:br>
+            <a:endParaRPr lang="en-US" sz="1200" b="1">
+              <a:solidFill>
+                <a:srgbClr val="FFFFCC"/>
+              </a:solidFill>
+            </a:endParaRPr>
+          </a:p>
+          <a:p>
+            <a:r>
+              <a:rPr lang="en-US" sz="1400"/>
+              <a:t>Not a Standard but a Recommendation</a:t>
+            </a:r>
+          </a:p>
+          <a:p>
+            <a:pPr lvl="1"/>
+            <a:r>
+              <a:rPr lang="en-US" sz="1200"/>
+              <a:t>Recommendation means open to interpretation</a:t>
+            </a:r>
+          </a:p>
+          <a:p>
+            <a:pPr lvl="1"/>
+            <a:r>
+              <a:rPr lang="en-US" sz="1200"/>
+              <a:t>Loose set of </a:t>
+            </a:r>
+            <a:r>
+              <a:rPr lang="en-US" sz="1200" b="1">
+                <a:solidFill>
+                  <a:srgbClr val="FFFFCC"/>
+                </a:solidFill>
+              </a:rPr>
+              <a:t>recommendations</a:t>
+            </a:r>
+          </a:p>
+          <a:p>
+            <a:pPr lvl="1"/>
+            <a:r>
+              <a:rPr lang="en-US" sz="1200"/>
+              <a:t>The opposite of a complex server architecture like SOAP</a:t>
+            </a:r>
+            <a:endParaRPr lang="en-US" sz="1200">
+              <a:solidFill>
+                <a:srgbClr val="FFFFCC"/>
+              </a:solidFill>
+            </a:endParaRPr>
+          </a:p>
+          <a:p>
+            <a:r>
+              <a:rPr lang="en-US" sz="1400"/>
+              <a:t>Built around HTTP and JSON</a:t>
+            </a:r>
+          </a:p>
+          <a:p>
+            <a:pPr lvl="1"/>
+            <a:r>
+              <a:rPr lang="en-US" sz="1200"/>
+              <a:t>Unique Resource Routes via URLs</a:t>
+            </a:r>
+          </a:p>
+          <a:p>
+            <a:pPr lvl="1"/>
+            <a:r>
+              <a:rPr lang="en-US" sz="1200"/>
+              <a:t>Actions via HTTP Verbs </a:t>
+            </a:r>
+            <a:r>
+              <a:rPr lang="en-US" sz="1050" i="1"/>
+              <a:t> (GET, POST, PUT, Delete etc.)</a:t>
+            </a:r>
+            <a:r>
+              <a:rPr lang="en-US" sz="1200"/>
+              <a:t> </a:t>
+            </a:r>
+          </a:p>
+          <a:p>
+            <a:pPr lvl="1"/>
+            <a:r>
+              <a:rPr lang="en-US" sz="1200"/>
+              <a:t>Headers: Separation of Meta Data and Content Data</a:t>
+            </a:r>
+          </a:p>
+          <a:p>
+            <a:pPr lvl="1"/>
+            <a:r>
+              <a:rPr lang="en-US" sz="1200"/>
+              <a:t>Secure encryption via </a:t>
+            </a:r>
+            <a:r>
+              <a:rPr lang="en-US" sz="1200">
+                <a:solidFill>
+                  <a:srgbClr val="FFC000"/>
+                </a:solidFill>
+                <a:latin typeface="Consolas" panose="020B0609020204030204" pitchFamily="49" charset="0"/>
+              </a:rPr>
+              <a:t>https://</a:t>
+            </a:r>
+          </a:p>
+          <a:p>
+            <a:pPr lvl="1"/>
+            <a:r>
+              <a:rPr lang="en-US" sz="1200"/>
+              <a:t>Built-in caching support</a:t>
+            </a:r>
+          </a:p>
+          <a:p>
+            <a:pPr lvl="1"/>
+            <a:r>
+              <a:rPr lang="en-US" sz="1200"/>
+              <a:t>JSON as data transport</a:t>
+            </a:r>
+          </a:p>
+          <a:p>
+            <a:pPr marL="457200" lvl="1" indent="0">
+              <a:buNone/>
+            </a:pPr>
+            <a:endParaRPr lang="en-US"/>
+          </a:p>
+          <a:p>
+            <a:endParaRPr lang="en-US"/>
+          </a:p>
+          <a:p>
+            <a:pPr lvl="1"/>
+            <a:endParaRPr lang="en-US"/>
+          </a:p>
+          <a:p>
+            <a:pPr marL="457200" lvl="1" indent="0">
+              <a:buNone/>
+            </a:pPr>
+            <a:endParaRPr lang="en-US"/>
+          </a:p>
+        </p:txBody>
+      </p:sp>
+      <p:pic>
+        <p:nvPicPr>
+          <p:cNvPr id="1036" name="Picture 12">
+            <a:extLst>
+              <a:ext uri="{FF2B5EF4-FFF2-40B4-BE49-F238E27FC236}">
+                <a16:creationId xmlns:a16="http://schemas.microsoft.com/office/drawing/2014/main" id="{1135617F-E913-4600-8BF9-E5E56E8DC09E}"/>
+              </a:ext>
+            </a:extLst>
+          </p:cNvPr>
+          <p:cNvPicPr>
+            <a:picLocks noChangeAspect="1" noChangeArrowheads="1"/>
+          </p:cNvPicPr>
+          <p:nvPr/>
+        </p:nvPicPr>
+        <p:blipFill>
+          <a:blip r:embed="rId2">
+            <a:extLst>
+              <a:ext uri="{28A0092B-C50C-407E-A947-70E740481C1C}">
+                <a14:useLocalDpi xmlns:a14="http://schemas.microsoft.com/office/drawing/2010/main" val="0"/>
+              </a:ext>
+            </a:extLst>
+          </a:blip>
+          <a:srcRect/>
+          <a:stretch>
+            <a:fillRect/>
+          </a:stretch>
+        </p:blipFill>
+        <p:spPr bwMode="auto">
+          <a:xfrm>
+            <a:off x="6002307" y="762000"/>
+            <a:ext cx="6116532" cy="5638800"/>
+          </a:xfrm>
+          <a:prstGeom prst="rect">
+            <a:avLst/>
+          </a:prstGeom>
+          <a:noFill/>
+          <a:extLst>
+            <a:ext uri="{909E8E84-426E-40DD-AFC4-6F175D3DCCD1}">
+              <a14:hiddenFill xmlns:a14="http://schemas.microsoft.com/office/drawing/2010/main">
+                <a:solidFill>
+                  <a:srgbClr val="FFFFFF"/>
+                </a:solidFill>
+              </a14:hiddenFill>
+            </a:ext>
+          </a:extLst>
+        </p:spPr>
+      </p:pic>
+    </p:spTree>
+    <p:extLst>
+      <p:ext uri="{BB962C8B-B14F-4D97-AF65-F5344CB8AC3E}">
+        <p14:creationId xmlns:p14="http://schemas.microsoft.com/office/powerpoint/2010/main" val="4211681918"/>
+      </p:ext>
+    </p:extLst>
+  </p:cSld>
+  <p:clrMapOvr>
+    <a:masterClrMapping/>
+  </p:clrMapOvr>
+  <p:transition>
+    <p:wipe/>
+  </p:transition>
+</p:sld>
+</file>
+
+<file path=ppt/slides/slide4.xml><?xml version="1.0" encoding="utf-8"?>
+<p:sld xmlns:a="http://schemas.openxmlformats.org/drawingml/2006/main" xmlns:r="http://schemas.openxmlformats.org/officeDocument/2006/relationships" xmlns:p="http://schemas.openxmlformats.org/presentationml/2006/main">
+  <p:cSld>
+    <p:spTree>
+      <p:nvGrpSpPr>
+        <p:cNvPr id="1" name=""/>
+        <p:cNvGrpSpPr/>
+        <p:nvPr/>
+      </p:nvGrpSpPr>
+      <p:grpSpPr>
+        <a:xfrm>
+          <a:off x="0" y="0"/>
+          <a:ext cx="0" cy="0"/>
+          <a:chOff x="0" y="0"/>
+          <a:chExt cx="0" cy="0"/>
+        </a:xfrm>
+      </p:grpSpPr>
+      <p:sp>
+        <p:nvSpPr>
+          <p:cNvPr id="2" name="Title 1">
+            <a:extLst>
+              <a:ext uri="{FF2B5EF4-FFF2-40B4-BE49-F238E27FC236}">
+                <a16:creationId xmlns:a16="http://schemas.microsoft.com/office/drawing/2014/main" id="{9BD408D4-1A9F-4F9D-A4E6-F56112E09E90}"/>
+              </a:ext>
+            </a:extLst>
+          </p:cNvPr>
+          <p:cNvSpPr>
+            <a:spLocks noGrp="1"/>
+          </p:cNvSpPr>
+          <p:nvPr>
+            <p:ph type="title"/>
+          </p:nvPr>
+        </p:nvSpPr>
+        <p:spPr>
+          <a:xfrm>
+            <a:off x="0" y="152400"/>
+            <a:ext cx="7696200" cy="457200"/>
+          </a:xfrm>
+        </p:spPr>
+        <p:txBody>
+          <a:bodyPr/>
+          <a:lstStyle/>
+          <a:p>
+            <a:r>
+              <a:rPr lang="en-US"/>
+              <a:t>Anatomy of a REST Request</a:t>
+            </a:r>
+          </a:p>
+        </p:txBody>
+      </p:sp>
+      <p:pic>
+        <p:nvPicPr>
+          <p:cNvPr id="1026" name="Picture 2">
+            <a:extLst>
+              <a:ext uri="{FF2B5EF4-FFF2-40B4-BE49-F238E27FC236}">
+                <a16:creationId xmlns:a16="http://schemas.microsoft.com/office/drawing/2014/main" id="{DB8BB902-1486-48CB-93D8-4D45C46C8AAD}"/>
+              </a:ext>
+            </a:extLst>
+          </p:cNvPr>
+          <p:cNvPicPr>
+            <a:picLocks noGrp="1" noChangeAspect="1" noChangeArrowheads="1"/>
+          </p:cNvPicPr>
+          <p:nvPr>
+            <p:ph idx="1"/>
+          </p:nvPr>
+        </p:nvPicPr>
+        <p:blipFill>
+          <a:blip r:embed="rId2">
+            <a:extLst>
+              <a:ext uri="{28A0092B-C50C-407E-A947-70E740481C1C}">
+                <a14:useLocalDpi xmlns:a14="http://schemas.microsoft.com/office/drawing/2010/main" val="0"/>
+              </a:ext>
+            </a:extLst>
+          </a:blip>
+          <a:srcRect/>
+          <a:stretch>
+            <a:fillRect/>
+          </a:stretch>
+        </p:blipFill>
+        <p:spPr bwMode="auto">
+          <a:xfrm>
+            <a:off x="7647099" y="1"/>
+            <a:ext cx="4621100" cy="6934199"/>
+          </a:xfrm>
+          <a:prstGeom prst="rect">
+            <a:avLst/>
+          </a:prstGeom>
+          <a:noFill/>
+          <a:extLst>
+            <a:ext uri="{909E8E84-426E-40DD-AFC4-6F175D3DCCD1}">
+              <a14:hiddenFill xmlns:a14="http://schemas.microsoft.com/office/drawing/2010/main">
+                <a:solidFill>
+                  <a:srgbClr val="FFFFFF"/>
+                </a:solidFill>
+              </a14:hiddenFill>
+            </a:ext>
+          </a:extLst>
+        </p:spPr>
+      </p:pic>
+      <p:sp>
+        <p:nvSpPr>
+          <p:cNvPr id="5" name="Content Placeholder 2">
+            <a:extLst>
+              <a:ext uri="{FF2B5EF4-FFF2-40B4-BE49-F238E27FC236}">
+                <a16:creationId xmlns:a16="http://schemas.microsoft.com/office/drawing/2014/main" id="{13F26BBD-00EB-4E89-99FD-C34C03BB5CD2}"/>
+              </a:ext>
+            </a:extLst>
+          </p:cNvPr>
+          <p:cNvSpPr txBox="1">
+            <a:spLocks/>
+          </p:cNvSpPr>
+          <p:nvPr/>
+        </p:nvSpPr>
+        <p:spPr bwMode="auto">
+          <a:xfrm>
+            <a:off x="609600" y="1219200"/>
+            <a:ext cx="6324600" cy="5334000"/>
+          </a:xfrm>
+          <a:prstGeom prst="rect">
+            <a:avLst/>
+          </a:prstGeom>
+          <a:solidFill>
+            <a:schemeClr val="tx2">
+              <a:alpha val="0"/>
+            </a:schemeClr>
+          </a:solidFill>
+          <a:ln>
+            <a:noFill/>
+          </a:ln>
+          <a:effectLst>
+            <a:glow rad="127000">
+              <a:schemeClr val="bg1">
+                <a:alpha val="19000"/>
+              </a:schemeClr>
+            </a:glow>
+            <a:softEdge rad="50800"/>
+          </a:effectLst>
+          <a:extLst>
+            <a:ext uri="{91240B29-F687-4F45-9708-019B960494DF}">
+              <a14:hiddenLine xmlns:a14="http://schemas.microsoft.com/office/drawing/2010/main" w="9525">
+                <a:solidFill>
+                  <a:srgbClr val="000000"/>
+                </a:solidFill>
+                <a:miter lim="800000"/>
+                <a:headEnd/>
+                <a:tailEnd/>
+              </a14:hiddenLine>
+            </a:ext>
+          </a:extLst>
+        </p:spPr>
+        <p:txBody>
+          <a:bodyPr vert="horz" wrap="square" lIns="182880" tIns="91440" rIns="91440" bIns="45720" numCol="1" anchor="t" anchorCtr="0" compatLnSpc="1">
+            <a:prstTxWarp prst="textNoShape">
+              <a:avLst/>
+            </a:prstTxWarp>
+          </a:bodyPr>
+          <a:lstStyle>
+            <a:lvl1pPr marL="342900" indent="-342900" algn="l" rtl="0" eaLnBrk="0" fontAlgn="base" hangingPunct="0">
+              <a:spcBef>
+                <a:spcPts val="1000"/>
+              </a:spcBef>
+              <a:spcAft>
+                <a:spcPct val="0"/>
+              </a:spcAft>
+              <a:buChar char="•"/>
+              <a:defRPr sz="2000" b="1">
+                <a:solidFill>
+                  <a:srgbClr val="FFCC00"/>
+                </a:solidFill>
+                <a:effectLst>
+                  <a:outerShdw blurRad="38100" dist="38100" dir="2700000" algn="tl">
+                    <a:srgbClr val="000000">
+                      <a:alpha val="43137"/>
+                    </a:srgbClr>
+                  </a:outerShdw>
+                </a:effectLst>
+                <a:latin typeface="+mn-lt"/>
+                <a:ea typeface="+mn-ea"/>
+                <a:cs typeface="+mn-cs"/>
+              </a:defRPr>
+            </a:lvl1pPr>
+            <a:lvl2pPr marL="742950" indent="-285750" algn="l" rtl="0" eaLnBrk="0" fontAlgn="base" hangingPunct="0">
+              <a:spcBef>
+                <a:spcPct val="20000"/>
+              </a:spcBef>
+              <a:spcAft>
+                <a:spcPct val="0"/>
+              </a:spcAft>
+              <a:buFont typeface="Wingdings" pitchFamily="2" charset="2"/>
+              <a:buChar char="§"/>
+              <a:defRPr>
+                <a:solidFill>
+                  <a:schemeClr val="tx1"/>
+                </a:solidFill>
+                <a:effectLst>
+                  <a:outerShdw blurRad="38100" dist="38100" dir="2700000" algn="tl">
+                    <a:srgbClr val="000000">
+                      <a:alpha val="43137"/>
+                    </a:srgbClr>
+                  </a:outerShdw>
+                </a:effectLst>
+                <a:latin typeface="+mn-lt"/>
+              </a:defRPr>
+            </a:lvl2pPr>
+            <a:lvl3pPr marL="1143000" indent="-228600" algn="l" rtl="0" eaLnBrk="0" fontAlgn="base" hangingPunct="0">
+              <a:spcBef>
+                <a:spcPct val="20000"/>
+              </a:spcBef>
+              <a:spcAft>
+                <a:spcPct val="0"/>
+              </a:spcAft>
+              <a:buFont typeface="Wingdings" pitchFamily="2" charset="2"/>
+              <a:buChar char="§"/>
+              <a:defRPr>
+                <a:solidFill>
+                  <a:schemeClr val="tx1"/>
+                </a:solidFill>
+                <a:effectLst>
+                  <a:outerShdw blurRad="38100" dist="38100" dir="2700000" algn="tl">
+                    <a:srgbClr val="000000">
+                      <a:alpha val="43137"/>
+                    </a:srgbClr>
+                  </a:outerShdw>
+                </a:effectLst>
+                <a:latin typeface="+mn-lt"/>
+              </a:defRPr>
+            </a:lvl3pPr>
+            <a:lvl4pPr marL="1600200" indent="-228600" algn="l" rtl="0" eaLnBrk="0" fontAlgn="base" hangingPunct="0">
+              <a:spcBef>
+                <a:spcPct val="20000"/>
+              </a:spcBef>
+              <a:spcAft>
+                <a:spcPct val="0"/>
+              </a:spcAft>
+              <a:buChar char="–"/>
+              <a:defRPr sz="1600">
+                <a:solidFill>
+                  <a:schemeClr val="tx1"/>
+                </a:solidFill>
+                <a:latin typeface="+mj-lt"/>
+              </a:defRPr>
+            </a:lvl4pPr>
+            <a:lvl5pPr marL="2057400" indent="-228600" algn="l" rtl="0" eaLnBrk="0" fontAlgn="base" hangingPunct="0">
+              <a:spcBef>
+                <a:spcPct val="20000"/>
+              </a:spcBef>
+              <a:spcAft>
+                <a:spcPct val="0"/>
+              </a:spcAft>
+              <a:buChar char="»"/>
+              <a:defRPr sz="1800">
+                <a:solidFill>
+                  <a:schemeClr val="tx1"/>
+                </a:solidFill>
+                <a:latin typeface="+mj-lt"/>
+              </a:defRPr>
+            </a:lvl5pPr>
+            <a:lvl6pPr marL="2514600" indent="-228600" algn="l" rtl="0" fontAlgn="base">
+              <a:spcBef>
+                <a:spcPct val="20000"/>
+              </a:spcBef>
+              <a:spcAft>
+                <a:spcPct val="0"/>
+              </a:spcAft>
+              <a:buChar char="»"/>
+              <a:defRPr sz="2000">
+                <a:solidFill>
+                  <a:schemeClr val="tx1"/>
+                </a:solidFill>
+                <a:latin typeface="Times New Roman" pitchFamily="18" charset="0"/>
+              </a:defRPr>
+            </a:lvl6pPr>
+            <a:lvl7pPr marL="2971800" indent="-228600" algn="l" rtl="0" fontAlgn="base">
+              <a:spcBef>
+                <a:spcPct val="20000"/>
+              </a:spcBef>
+              <a:spcAft>
+                <a:spcPct val="0"/>
+              </a:spcAft>
+              <a:buChar char="»"/>
+              <a:defRPr sz="2000">
+                <a:solidFill>
+                  <a:schemeClr val="tx1"/>
+                </a:solidFill>
+                <a:latin typeface="Times New Roman" pitchFamily="18" charset="0"/>
+              </a:defRPr>
+            </a:lvl7pPr>
+            <a:lvl8pPr marL="3429000" indent="-228600" algn="l" rtl="0" fontAlgn="base">
+              <a:spcBef>
+                <a:spcPct val="20000"/>
+              </a:spcBef>
+              <a:spcAft>
+                <a:spcPct val="0"/>
+              </a:spcAft>
+              <a:buChar char="»"/>
+              <a:defRPr sz="2000">
+                <a:solidFill>
+                  <a:schemeClr val="tx1"/>
+                </a:solidFill>
+                <a:latin typeface="Times New Roman" pitchFamily="18" charset="0"/>
+              </a:defRPr>
+            </a:lvl8pPr>
+            <a:lvl9pPr marL="3886200" indent="-228600" algn="l" rtl="0" fontAlgn="base">
+              <a:spcBef>
+                <a:spcPct val="20000"/>
+              </a:spcBef>
+              <a:spcAft>
+                <a:spcPct val="0"/>
+              </a:spcAft>
+              <a:buChar char="»"/>
+              <a:defRPr sz="2000">
+                <a:solidFill>
+                  <a:schemeClr val="tx1"/>
+                </a:solidFill>
+                <a:latin typeface="Times New Roman" pitchFamily="18" charset="0"/>
+              </a:defRPr>
+            </a:lvl9pPr>
+          </a:lstStyle>
+          <a:p>
+            <a:r>
+              <a:rPr lang="en-US" sz="1400" kern="0"/>
+              <a:t>APIs over HTTP</a:t>
+            </a:r>
+          </a:p>
+          <a:p>
+            <a:pPr lvl="1"/>
+            <a:r>
+              <a:rPr lang="en-US" sz="1200" b="0" kern="0"/>
+              <a:t>URLs provide unique routing</a:t>
+            </a:r>
+          </a:p>
+          <a:p>
+            <a:pPr lvl="1"/>
+            <a:r>
+              <a:rPr lang="en-US" sz="1200" b="0" kern="0"/>
+              <a:t>Verbs provide the Action to take </a:t>
+            </a:r>
+            <a:r>
+              <a:rPr lang="en-US" sz="1050" b="0" i="1" kern="0"/>
+              <a:t>(GET, POST, DELETE)</a:t>
+            </a:r>
+          </a:p>
+          <a:p>
+            <a:pPr lvl="1"/>
+            <a:r>
+              <a:rPr lang="en-US" sz="1200" b="0" kern="0"/>
+              <a:t>Request &amp; Response Headers provide Meta Data</a:t>
+            </a:r>
+          </a:p>
+          <a:p>
+            <a:pPr lvl="1"/>
+            <a:r>
+              <a:rPr lang="en-US" sz="1200" b="0" kern="0"/>
+              <a:t>Transactional Request and Response </a:t>
+            </a:r>
+            <a:r>
+              <a:rPr lang="en-US" sz="1050" b="0" i="1" kern="0"/>
+              <a:t>(transactional)</a:t>
+            </a:r>
+          </a:p>
+          <a:p>
+            <a:pPr lvl="1"/>
+            <a:r>
+              <a:rPr lang="en-US" sz="1200" b="0" kern="0"/>
+              <a:t>Stateless</a:t>
+            </a:r>
+            <a:br>
+              <a:rPr lang="en-US" sz="1200" b="0" kern="0"/>
+            </a:br>
+            <a:endParaRPr lang="en-US" sz="1200" b="0" kern="0"/>
+          </a:p>
+          <a:p>
+            <a:r>
+              <a:rPr lang="en-US" sz="1400" kern="0"/>
+              <a:t>Sending Requests</a:t>
+            </a:r>
+          </a:p>
+          <a:p>
+            <a:pPr lvl="1"/>
+            <a:r>
+              <a:rPr lang="en-US" sz="1200" b="0" kern="0"/>
+              <a:t>Specify URL to route, Verb for action</a:t>
+            </a:r>
+          </a:p>
+          <a:p>
+            <a:pPr lvl="1"/>
+            <a:r>
+              <a:rPr lang="en-US" sz="1200" b="0" kern="0"/>
+              <a:t>Every requests sends HTTP Headers</a:t>
+            </a:r>
+          </a:p>
+          <a:p>
+            <a:pPr lvl="1"/>
+            <a:r>
+              <a:rPr lang="en-US" sz="1200" b="0" kern="0"/>
+              <a:t>HTTP POST or PUT to send data</a:t>
+            </a:r>
+          </a:p>
+          <a:p>
+            <a:pPr lvl="1"/>
+            <a:r>
+              <a:rPr lang="en-US" sz="1200" b="0" kern="0"/>
+              <a:t>Data is serializeed as JSON (optional)</a:t>
+            </a:r>
+            <a:br>
+              <a:rPr lang="en-US" sz="1200" b="0" kern="0"/>
+            </a:br>
+            <a:endParaRPr lang="en-US" sz="1200" b="0" kern="0"/>
+          </a:p>
+          <a:p>
+            <a:r>
+              <a:rPr lang="en-US" sz="1600" kern="0"/>
+              <a:t>Receiving Responses</a:t>
+            </a:r>
+          </a:p>
+          <a:p>
+            <a:pPr lvl="1"/>
+            <a:r>
+              <a:rPr lang="en-US" sz="1200" b="0" kern="0"/>
+              <a:t>Request returns Status Codes </a:t>
+            </a:r>
+            <a:r>
+              <a:rPr lang="en-US" sz="1100" b="0" i="1" kern="0"/>
+              <a:t>(200, 401, 401, 500 etc.)</a:t>
+            </a:r>
+            <a:endParaRPr lang="en-US" sz="1200" b="0" i="1" kern="0"/>
+          </a:p>
+          <a:p>
+            <a:pPr lvl="1"/>
+            <a:r>
+              <a:rPr lang="en-US" sz="1200" b="0" kern="0"/>
+              <a:t>Response Meta Data via HTTP Headers</a:t>
+            </a:r>
+          </a:p>
+          <a:p>
+            <a:pPr lvl="1"/>
+            <a:r>
+              <a:rPr lang="en-US" sz="1200" b="0" kern="0"/>
+              <a:t>Server returns data as JSON</a:t>
+            </a:r>
+          </a:p>
+          <a:p>
+            <a:pPr lvl="1"/>
+            <a:r>
+              <a:rPr lang="en-US" sz="1400" b="0" kern="0"/>
+              <a:t>Standard Error Codes for Request Status</a:t>
+            </a:r>
+          </a:p>
+          <a:p>
+            <a:pPr marL="457200" lvl="1" indent="0">
+              <a:buNone/>
+            </a:pPr>
+            <a:r>
+              <a:rPr lang="en-US" sz="1600" kern="0"/>
+              <a:t>	</a:t>
+            </a:r>
+          </a:p>
+          <a:p>
+            <a:pPr lvl="1"/>
+            <a:endParaRPr lang="en-US" sz="1400" kern="0"/>
+          </a:p>
+          <a:p>
+            <a:pPr lvl="1"/>
+            <a:endParaRPr lang="en-US" sz="1400" b="0" kern="0"/>
+          </a:p>
+          <a:p>
+            <a:pPr marL="457200" lvl="1" indent="0">
+              <a:buFont typeface="Wingdings" pitchFamily="2" charset="2"/>
+              <a:buNone/>
+            </a:pPr>
+            <a:endParaRPr lang="en-US" b="0" kern="0"/>
+          </a:p>
+        </p:txBody>
+      </p:sp>
+    </p:spTree>
+    <p:extLst>
+      <p:ext uri="{BB962C8B-B14F-4D97-AF65-F5344CB8AC3E}">
+        <p14:creationId xmlns:p14="http://schemas.microsoft.com/office/powerpoint/2010/main" val="2512932046"/>
+      </p:ext>
+    </p:extLst>
+  </p:cSld>
+  <p:clrMapOvr>
+    <a:masterClrMapping/>
+  </p:clrMapOvr>
+  <p:transition>
+    <p:wipe/>
+  </p:transition>
+</p:sld>
+</file>
+
+<file path=ppt/slides/slide5.xml><?xml version="1.0" encoding="utf-8"?>
+<p:sld xmlns:a="http://schemas.openxmlformats.org/drawingml/2006/main" xmlns:r="http://schemas.openxmlformats.org/officeDocument/2006/relationships" xmlns:p="http://schemas.openxmlformats.org/presentationml/2006/main">
+  <p:cSld>
+    <p:spTree>
+      <p:nvGrpSpPr>
+        <p:cNvPr id="1" name=""/>
+        <p:cNvGrpSpPr/>
+        <p:nvPr/>
+      </p:nvGrpSpPr>
+      <p:grpSpPr>
+        <a:xfrm>
+          <a:off x="0" y="0"/>
+          <a:ext cx="0" cy="0"/>
+          <a:chOff x="0" y="0"/>
+          <a:chExt cx="0" cy="0"/>
+        </a:xfrm>
+      </p:grpSpPr>
+      <p:sp>
+        <p:nvSpPr>
+          <p:cNvPr id="2" name="Title 1">
+            <a:extLst>
+              <a:ext uri="{FF2B5EF4-FFF2-40B4-BE49-F238E27FC236}">
+                <a16:creationId xmlns:a16="http://schemas.microsoft.com/office/drawing/2014/main" id="{0EE66AA0-CD20-450B-A451-BA9B35BB25C4}"/>
+              </a:ext>
+            </a:extLst>
+          </p:cNvPr>
+          <p:cNvSpPr>
+            <a:spLocks noGrp="1"/>
+          </p:cNvSpPr>
+          <p:nvPr>
+            <p:ph type="title"/>
+          </p:nvPr>
+        </p:nvSpPr>
+        <p:spPr/>
+        <p:txBody>
+          <a:bodyPr/>
+          <a:lstStyle/>
+          <a:p>
+            <a:r>
+              <a:rPr lang="en-US"/>
+              <a:t>REST Application Scenarios for FoxPro</a:t>
+            </a:r>
+          </a:p>
+        </p:txBody>
+      </p:sp>
+      <p:sp>
+        <p:nvSpPr>
+          <p:cNvPr id="3" name="Content Placeholder 2">
+            <a:extLst>
+              <a:ext uri="{FF2B5EF4-FFF2-40B4-BE49-F238E27FC236}">
+                <a16:creationId xmlns:a16="http://schemas.microsoft.com/office/drawing/2014/main" id="{147A812B-3535-4AD8-BBCE-5004E244E1AE}"/>
+              </a:ext>
+            </a:extLst>
+          </p:cNvPr>
+          <p:cNvSpPr>
+            <a:spLocks noGrp="1"/>
+          </p:cNvSpPr>
+          <p:nvPr>
+            <p:ph idx="1"/>
+          </p:nvPr>
+        </p:nvSpPr>
+        <p:spPr>
+          <a:xfrm>
+            <a:off x="1371600" y="1371600"/>
+            <a:ext cx="10515600" cy="4876800"/>
+          </a:xfrm>
+        </p:spPr>
+        <p:txBody>
+          <a:bodyPr/>
+          <a:lstStyle/>
+          <a:p>
+            <a:r>
+              <a:rPr lang="en-US" sz="2400"/>
+              <a:t>Calling REST APIs from FoxPro</a:t>
+            </a:r>
+          </a:p>
+          <a:p>
+            <a:pPr lvl="1"/>
+            <a:r>
+              <a:rPr lang="en-US" sz="2200"/>
+              <a:t>What you need:</a:t>
+            </a:r>
+          </a:p>
+          <a:p>
+            <a:pPr lvl="2"/>
+            <a:r>
+              <a:rPr lang="en-US" sz="2000"/>
+              <a:t>HTTP Client </a:t>
+            </a:r>
+          </a:p>
+          <a:p>
+            <a:pPr lvl="2"/>
+            <a:r>
+              <a:rPr lang="en-US" sz="2000"/>
+              <a:t>JSON Serializer</a:t>
+            </a:r>
+          </a:p>
+          <a:p>
+            <a:pPr lvl="1"/>
+            <a:endParaRPr lang="en-US" sz="2000"/>
+          </a:p>
+          <a:p>
+            <a:r>
+              <a:rPr lang="en-US" sz="2400"/>
+              <a:t>Creating REST API Services with Foxpro</a:t>
+            </a:r>
+          </a:p>
+          <a:p>
+            <a:pPr lvl="1"/>
+            <a:r>
+              <a:rPr lang="en-US" sz="2200"/>
+              <a:t>What you need:</a:t>
+            </a:r>
+          </a:p>
+          <a:p>
+            <a:pPr lvl="2"/>
+            <a:r>
+              <a:rPr lang="en-US" sz="2000"/>
+              <a:t>Web Server</a:t>
+            </a:r>
+          </a:p>
+          <a:p>
+            <a:pPr lvl="2"/>
+            <a:r>
+              <a:rPr lang="en-US" sz="2000"/>
+              <a:t>Web Application Framework </a:t>
+            </a:r>
+            <a:r>
+              <a:rPr lang="en-US" sz="1200"/>
+              <a:t>(ie. Web Connection, ASP.NET etc.)</a:t>
+            </a:r>
+            <a:endParaRPr lang="en-US" sz="2000"/>
+          </a:p>
+          <a:p>
+            <a:pPr lvl="2"/>
+            <a:r>
+              <a:rPr lang="en-US" sz="2000"/>
+              <a:t>REST Framework</a:t>
+            </a:r>
+          </a:p>
+          <a:p>
+            <a:pPr lvl="2"/>
+            <a:r>
+              <a:rPr lang="en-US" sz="2000"/>
+              <a:t>or: JSON Serializer for manual handling</a:t>
+            </a:r>
+          </a:p>
+        </p:txBody>
+      </p:sp>
+    </p:spTree>
+    <p:extLst>
+      <p:ext uri="{BB962C8B-B14F-4D97-AF65-F5344CB8AC3E}">
+        <p14:creationId xmlns:p14="http://schemas.microsoft.com/office/powerpoint/2010/main" val="4119541990"/>
+      </p:ext>
+    </p:extLst>
+  </p:cSld>
+  <p:clrMapOvr>
+    <a:masterClrMapping/>
+  </p:clrMapOvr>
+  <p:transition>
+    <p:wipe/>
+  </p:transition>
+</p:sld>
+</file>
+
+<file path=ppt/slides/slide6.xml><?xml version="1.0" encoding="utf-8"?>
+<p:sld xmlns:a="http://schemas.openxmlformats.org/drawingml/2006/main" xmlns:r="http://schemas.openxmlformats.org/officeDocument/2006/relationships" xmlns:p="http://schemas.openxmlformats.org/presentationml/2006/main">
+  <p:cSld>
+    <p:spTree>
+      <p:nvGrpSpPr>
+        <p:cNvPr id="1" name=""/>
+        <p:cNvGrpSpPr/>
+        <p:nvPr/>
+      </p:nvGrpSpPr>
+      <p:grpSpPr>
+        <a:xfrm>
+          <a:off x="0" y="0"/>
+          <a:ext cx="0" cy="0"/>
+          <a:chOff x="0" y="0"/>
+          <a:chExt cx="0" cy="0"/>
+        </a:xfrm>
+      </p:grpSpPr>
+      <p:sp>
+        <p:nvSpPr>
+          <p:cNvPr id="2" name="Title 1">
+            <a:extLst>
+              <a:ext uri="{FF2B5EF4-FFF2-40B4-BE49-F238E27FC236}">
+                <a16:creationId xmlns:a16="http://schemas.microsoft.com/office/drawing/2014/main" id="{A091DAF1-471D-4512-AD18-87255AFF6B73}"/>
+              </a:ext>
+            </a:extLst>
+          </p:cNvPr>
+          <p:cNvSpPr>
+            <a:spLocks noGrp="1"/>
+          </p:cNvSpPr>
+          <p:nvPr>
+            <p:ph type="title"/>
+          </p:nvPr>
+        </p:nvSpPr>
+        <p:spPr/>
+        <p:txBody>
+          <a:bodyPr/>
+          <a:lstStyle/>
+          <a:p>
+            <a:r>
+              <a:rPr lang="en-US"/>
+              <a:t>Tools for Calling a REST Service</a:t>
+            </a:r>
+          </a:p>
+        </p:txBody>
+      </p:sp>
+      <p:sp>
+        <p:nvSpPr>
+          <p:cNvPr id="3" name="Content Placeholder 2">
+            <a:extLst>
+              <a:ext uri="{FF2B5EF4-FFF2-40B4-BE49-F238E27FC236}">
+                <a16:creationId xmlns:a16="http://schemas.microsoft.com/office/drawing/2014/main" id="{293516CB-5267-4E99-8F17-25E3214AB516}"/>
+              </a:ext>
+            </a:extLst>
+          </p:cNvPr>
+          <p:cNvSpPr>
+            <a:spLocks noGrp="1"/>
+          </p:cNvSpPr>
+          <p:nvPr>
+            <p:ph idx="1"/>
+          </p:nvPr>
+        </p:nvSpPr>
+        <p:spPr>
+          <a:xfrm>
+            <a:off x="228600" y="1295400"/>
+            <a:ext cx="5410200" cy="5105400"/>
+          </a:xfrm>
+        </p:spPr>
+        <p:txBody>
+          <a:bodyPr/>
+          <a:lstStyle/>
+          <a:p>
+            <a:r>
+              <a:rPr lang="en-US"/>
+              <a:t>HTTP Client</a:t>
+            </a:r>
+          </a:p>
+          <a:p>
+            <a:pPr lvl="1"/>
+            <a:r>
+              <a:rPr lang="en-US"/>
+              <a:t>WinHTTP, WinInet</a:t>
+            </a:r>
+          </a:p>
+          <a:p>
+            <a:pPr lvl="1"/>
+            <a:r>
+              <a:rPr lang="en-US"/>
+              <a:t>wwHttp (West Wind tools)</a:t>
+            </a:r>
+          </a:p>
+          <a:p>
+            <a:pPr lvl="1"/>
+            <a:r>
+              <a:rPr lang="en-US"/>
+              <a:t>curl  (command line tool)</a:t>
+            </a:r>
+          </a:p>
+          <a:p>
+            <a:pPr lvl="1"/>
+            <a:r>
+              <a:rPr lang="en-US"/>
+              <a:t>Chilkat HTTP</a:t>
+            </a:r>
+          </a:p>
+          <a:p>
+            <a:pPr lvl="1"/>
+            <a:endParaRPr lang="en-US"/>
+          </a:p>
+          <a:p>
+            <a:r>
+              <a:rPr lang="en-US"/>
+              <a:t>JSON Serializer</a:t>
+            </a:r>
+          </a:p>
+          <a:p>
+            <a:pPr lvl="1"/>
+            <a:r>
+              <a:rPr lang="en-US"/>
+              <a:t>JSON Serialization and JSON Parsing</a:t>
+            </a:r>
+          </a:p>
+          <a:p>
+            <a:pPr lvl="1"/>
+            <a:r>
+              <a:rPr lang="en-US"/>
+              <a:t>Couple of options:</a:t>
+            </a:r>
+          </a:p>
+          <a:p>
+            <a:pPr lvl="2"/>
+            <a:r>
+              <a:rPr lang="en-US"/>
+              <a:t>wwJsonSerializer </a:t>
+            </a:r>
+          </a:p>
+          <a:p>
+            <a:pPr lvl="2"/>
+            <a:r>
+              <a:rPr lang="en-US"/>
+              <a:t>nfJson</a:t>
+            </a:r>
+          </a:p>
+          <a:p>
+            <a:pPr marL="914400" lvl="2" indent="0">
+              <a:buNone/>
+            </a:pPr>
+            <a:r>
+              <a:rPr lang="en-US"/>
+              <a:t>		</a:t>
+            </a:r>
+          </a:p>
+        </p:txBody>
+      </p:sp>
+      <p:sp>
+        <p:nvSpPr>
+          <p:cNvPr id="4" name="Content Placeholder 2">
+            <a:extLst>
+              <a:ext uri="{FF2B5EF4-FFF2-40B4-BE49-F238E27FC236}">
+                <a16:creationId xmlns:a16="http://schemas.microsoft.com/office/drawing/2014/main" id="{6BC13696-B9BE-4AD9-BE3D-E81709268368}"/>
+              </a:ext>
+            </a:extLst>
+          </p:cNvPr>
+          <p:cNvSpPr txBox="1">
+            <a:spLocks/>
+          </p:cNvSpPr>
+          <p:nvPr/>
+        </p:nvSpPr>
+        <p:spPr bwMode="auto">
+          <a:xfrm>
+            <a:off x="5867400" y="1312506"/>
+            <a:ext cx="5842000" cy="5105400"/>
+          </a:xfrm>
+          <a:prstGeom prst="rect">
+            <a:avLst/>
+          </a:prstGeom>
+          <a:solidFill>
+            <a:schemeClr val="tx2">
+              <a:alpha val="0"/>
+            </a:schemeClr>
+          </a:solidFill>
+          <a:ln>
+            <a:noFill/>
+          </a:ln>
+          <a:effectLst>
+            <a:glow rad="127000">
+              <a:schemeClr val="bg1">
+                <a:alpha val="19000"/>
+              </a:schemeClr>
+            </a:glow>
+            <a:softEdge rad="50800"/>
+          </a:effectLst>
+          <a:extLst>
+            <a:ext uri="{91240B29-F687-4F45-9708-019B960494DF}">
+              <a14:hiddenLine xmlns:a14="http://schemas.microsoft.com/office/drawing/2010/main" w="9525">
+                <a:solidFill>
+                  <a:srgbClr val="000000"/>
+                </a:solidFill>
+                <a:miter lim="800000"/>
+                <a:headEnd/>
+                <a:tailEnd/>
+              </a14:hiddenLine>
+            </a:ext>
+          </a:extLst>
+        </p:spPr>
+        <p:txBody>
+          <a:bodyPr vert="horz" wrap="square" lIns="182880" tIns="91440" rIns="91440" bIns="45720" numCol="1" anchor="t" anchorCtr="0" compatLnSpc="1">
+            <a:prstTxWarp prst="textNoShape">
+              <a:avLst/>
+            </a:prstTxWarp>
+          </a:bodyPr>
+          <a:lstStyle>
+            <a:lvl1pPr marL="342900" indent="-342900" algn="l" rtl="0" eaLnBrk="0" fontAlgn="base" hangingPunct="0">
+              <a:spcBef>
+                <a:spcPts val="1000"/>
+              </a:spcBef>
+              <a:spcAft>
+                <a:spcPct val="0"/>
+              </a:spcAft>
+              <a:buChar char="•"/>
+              <a:defRPr sz="2000" b="1">
+                <a:solidFill>
+                  <a:srgbClr val="FFCC00"/>
+                </a:solidFill>
+                <a:effectLst>
+                  <a:outerShdw blurRad="38100" dist="38100" dir="2700000" algn="tl">
+                    <a:srgbClr val="000000">
+                      <a:alpha val="43137"/>
+                    </a:srgbClr>
+                  </a:outerShdw>
+                </a:effectLst>
+                <a:latin typeface="+mn-lt"/>
+                <a:ea typeface="+mn-ea"/>
+                <a:cs typeface="+mn-cs"/>
+              </a:defRPr>
+            </a:lvl1pPr>
+            <a:lvl2pPr marL="742950" indent="-285750" algn="l" rtl="0" eaLnBrk="0" fontAlgn="base" hangingPunct="0">
+              <a:spcBef>
+                <a:spcPct val="20000"/>
+              </a:spcBef>
+              <a:spcAft>
+                <a:spcPct val="0"/>
+              </a:spcAft>
+              <a:buFont typeface="Wingdings" pitchFamily="2" charset="2"/>
+              <a:buChar char="§"/>
+              <a:defRPr>
+                <a:solidFill>
+                  <a:schemeClr val="tx1"/>
+                </a:solidFill>
+                <a:effectLst>
+                  <a:outerShdw blurRad="38100" dist="38100" dir="2700000" algn="tl">
+                    <a:srgbClr val="000000">
+                      <a:alpha val="43137"/>
+                    </a:srgbClr>
+                  </a:outerShdw>
+                </a:effectLst>
+                <a:latin typeface="+mn-lt"/>
+              </a:defRPr>
+            </a:lvl2pPr>
+            <a:lvl3pPr marL="1143000" indent="-228600" algn="l" rtl="0" eaLnBrk="0" fontAlgn="base" hangingPunct="0">
+              <a:spcBef>
+                <a:spcPct val="20000"/>
+              </a:spcBef>
+              <a:spcAft>
+                <a:spcPct val="0"/>
+              </a:spcAft>
+              <a:buFont typeface="Wingdings" pitchFamily="2" charset="2"/>
+              <a:buChar char="§"/>
+              <a:defRPr>
+                <a:solidFill>
+                  <a:schemeClr val="tx1"/>
+                </a:solidFill>
+                <a:effectLst>
+                  <a:outerShdw blurRad="38100" dist="38100" dir="2700000" algn="tl">
+                    <a:srgbClr val="000000">
+                      <a:alpha val="43137"/>
+                    </a:srgbClr>
+                  </a:outerShdw>
+                </a:effectLst>
+                <a:latin typeface="+mn-lt"/>
+              </a:defRPr>
+            </a:lvl3pPr>
+            <a:lvl4pPr marL="1600200" indent="-228600" algn="l" rtl="0" eaLnBrk="0" fontAlgn="base" hangingPunct="0">
+              <a:spcBef>
+                <a:spcPct val="20000"/>
+              </a:spcBef>
+              <a:spcAft>
+                <a:spcPct val="0"/>
+              </a:spcAft>
+              <a:buChar char="–"/>
+              <a:defRPr sz="1600">
+                <a:solidFill>
+                  <a:schemeClr val="tx1"/>
+                </a:solidFill>
+                <a:latin typeface="+mj-lt"/>
+              </a:defRPr>
+            </a:lvl4pPr>
+            <a:lvl5pPr marL="2057400" indent="-228600" algn="l" rtl="0" eaLnBrk="0" fontAlgn="base" hangingPunct="0">
+              <a:spcBef>
+                <a:spcPct val="20000"/>
+              </a:spcBef>
+              <a:spcAft>
+                <a:spcPct val="0"/>
+              </a:spcAft>
+              <a:buChar char="»"/>
+              <a:defRPr sz="1800">
+                <a:solidFill>
+                  <a:schemeClr val="tx1"/>
+                </a:solidFill>
+                <a:latin typeface="+mj-lt"/>
+              </a:defRPr>
+            </a:lvl5pPr>
+            <a:lvl6pPr marL="2514600" indent="-228600" algn="l" rtl="0" fontAlgn="base">
+              <a:spcBef>
+                <a:spcPct val="20000"/>
+              </a:spcBef>
+              <a:spcAft>
+                <a:spcPct val="0"/>
+              </a:spcAft>
+              <a:buChar char="»"/>
+              <a:defRPr sz="2000">
+                <a:solidFill>
+                  <a:schemeClr val="tx1"/>
+                </a:solidFill>
+                <a:latin typeface="Times New Roman" pitchFamily="18" charset="0"/>
+              </a:defRPr>
+            </a:lvl6pPr>
+            <a:lvl7pPr marL="2971800" indent="-228600" algn="l" rtl="0" fontAlgn="base">
+              <a:spcBef>
+                <a:spcPct val="20000"/>
+              </a:spcBef>
+              <a:spcAft>
+                <a:spcPct val="0"/>
+              </a:spcAft>
+              <a:buChar char="»"/>
+              <a:defRPr sz="2000">
+                <a:solidFill>
+                  <a:schemeClr val="tx1"/>
+                </a:solidFill>
+                <a:latin typeface="Times New Roman" pitchFamily="18" charset="0"/>
+              </a:defRPr>
+            </a:lvl7pPr>
+            <a:lvl8pPr marL="3429000" indent="-228600" algn="l" rtl="0" fontAlgn="base">
+              <a:spcBef>
+                <a:spcPct val="20000"/>
+              </a:spcBef>
+              <a:spcAft>
+                <a:spcPct val="0"/>
+              </a:spcAft>
+              <a:buChar char="»"/>
+              <a:defRPr sz="2000">
+                <a:solidFill>
+                  <a:schemeClr val="tx1"/>
+                </a:solidFill>
+                <a:latin typeface="Times New Roman" pitchFamily="18" charset="0"/>
+              </a:defRPr>
+            </a:lvl8pPr>
+            <a:lvl9pPr marL="3886200" indent="-228600" algn="l" rtl="0" fontAlgn="base">
+              <a:spcBef>
+                <a:spcPct val="20000"/>
+              </a:spcBef>
+              <a:spcAft>
+                <a:spcPct val="0"/>
+              </a:spcAft>
+              <a:buChar char="»"/>
+              <a:defRPr sz="2000">
+                <a:solidFill>
+                  <a:schemeClr val="tx1"/>
+                </a:solidFill>
+                <a:latin typeface="Times New Roman" pitchFamily="18" charset="0"/>
+              </a:defRPr>
+            </a:lvl9pPr>
+          </a:lstStyle>
+          <a:p>
+            <a:r>
+              <a:rPr lang="en-US" kern="0"/>
+              <a:t>Calling the Service</a:t>
+            </a:r>
+          </a:p>
+          <a:p>
+            <a:pPr lvl="1"/>
+            <a:r>
+              <a:rPr lang="en-US" kern="0"/>
+              <a:t>Serialize any data to send to JSON</a:t>
+            </a:r>
+          </a:p>
+          <a:p>
+            <a:pPr lvl="1"/>
+            <a:r>
+              <a:rPr lang="en-US" kern="0"/>
+              <a:t>Call the server over HTTP</a:t>
+            </a:r>
+          </a:p>
+          <a:p>
+            <a:pPr lvl="1"/>
+            <a:r>
+              <a:rPr lang="en-US" kern="0"/>
+              <a:t>Get back JSON response</a:t>
+            </a:r>
+          </a:p>
+          <a:p>
+            <a:pPr lvl="1"/>
+            <a:r>
+              <a:rPr lang="en-US" kern="0"/>
+              <a:t>Deserialize JSON</a:t>
+            </a:r>
+            <a:r>
+              <a:rPr lang="en-US" b="0" kern="0"/>
+              <a:t>	</a:t>
+            </a:r>
+          </a:p>
+        </p:txBody>
+      </p:sp>
+    </p:spTree>
+    <p:extLst>
+      <p:ext uri="{BB962C8B-B14F-4D97-AF65-F5344CB8AC3E}">
+        <p14:creationId xmlns:p14="http://schemas.microsoft.com/office/powerpoint/2010/main" val="4195039534"/>
+      </p:ext>
+    </p:extLst>
+  </p:cSld>
+  <p:clrMapOvr>
+    <a:masterClrMapping/>
+  </p:clrMapOvr>
+  <p:transition>
+    <p:wipe/>
+  </p:transition>
+</p:sld>
+</file>
+
+<file path=ppt/slides/slide7.xml><?xml version="1.0" encoding="utf-8"?>
+<p:sld xmlns:a="http://schemas.openxmlformats.org/drawingml/2006/main" xmlns:r="http://schemas.openxmlformats.org/officeDocument/2006/relationships" xmlns:p="http://schemas.openxmlformats.org/presentationml/2006/main">
+  <p:cSld>
+    <p:spTree>
+      <p:nvGrpSpPr>
+        <p:cNvPr id="1" name=""/>
+        <p:cNvGrpSpPr/>
+        <p:nvPr/>
+      </p:nvGrpSpPr>
+      <p:grpSpPr>
+        <a:xfrm>
+          <a:off x="0" y="0"/>
+          <a:ext cx="0" cy="0"/>
+          <a:chOff x="0" y="0"/>
+          <a:chExt cx="0" cy="0"/>
+        </a:xfrm>
+      </p:grpSpPr>
+      <p:sp>
+        <p:nvSpPr>
+          <p:cNvPr id="2" name="Title 1">
+            <a:extLst>
+              <a:ext uri="{FF2B5EF4-FFF2-40B4-BE49-F238E27FC236}">
+                <a16:creationId xmlns:a16="http://schemas.microsoft.com/office/drawing/2014/main" id="{42AF633A-664B-4BF8-BE96-13095ADA2FE7}"/>
+              </a:ext>
+            </a:extLst>
+          </p:cNvPr>
+          <p:cNvSpPr>
+            <a:spLocks noGrp="1"/>
+          </p:cNvSpPr>
+          <p:nvPr>
+            <p:ph type="ctrTitle"/>
+          </p:nvPr>
+        </p:nvSpPr>
+        <p:spPr/>
+        <p:txBody>
+          <a:bodyPr/>
+          <a:lstStyle/>
+          <a:p>
+            <a:r>
+              <a:rPr lang="en-US"/>
+              <a:t>Calling  REST APIs from FoxPro</a:t>
+            </a:r>
+          </a:p>
+        </p:txBody>
+      </p:sp>
+      <p:sp>
+        <p:nvSpPr>
+          <p:cNvPr id="3" name="Subtitle 2">
+            <a:extLst>
+              <a:ext uri="{FF2B5EF4-FFF2-40B4-BE49-F238E27FC236}">
+                <a16:creationId xmlns:a16="http://schemas.microsoft.com/office/drawing/2014/main" id="{585D8981-CA31-4EA3-8E49-614FCEB13CEF}"/>
+              </a:ext>
+            </a:extLst>
+          </p:cNvPr>
+          <p:cNvSpPr>
+            <a:spLocks noGrp="1"/>
+          </p:cNvSpPr>
+          <p:nvPr>
+            <p:ph type="subTitle" idx="1"/>
+          </p:nvPr>
+        </p:nvSpPr>
+        <p:spPr/>
+        <p:txBody>
+          <a:bodyPr/>
+          <a:lstStyle/>
+          <a:p>
+            <a:r>
+              <a:rPr lang="en-US"/>
+              <a:t>Interacting with Remote services</a:t>
+            </a:r>
+          </a:p>
+          <a:p>
+            <a:r>
+              <a:rPr lang="en-US"/>
+              <a:t>via HTTP and JSON</a:t>
+            </a:r>
+          </a:p>
+        </p:txBody>
+      </p:sp>
+    </p:spTree>
+    <p:extLst>
+      <p:ext uri="{BB962C8B-B14F-4D97-AF65-F5344CB8AC3E}">
+        <p14:creationId xmlns:p14="http://schemas.microsoft.com/office/powerpoint/2010/main" val="3018413596"/>
+      </p:ext>
+    </p:extLst>
+  </p:cSld>
+  <p:clrMapOvr>
+    <a:masterClrMapping/>
+  </p:clrMapOvr>
+  <p:transition>
+    <p:wipe/>
+  </p:transition>
+</p:sld>
+</file>
+
+<file path=ppt/slides/slide8.xml><?xml version="1.0" encoding="utf-8"?>
+<p:sld xmlns:a="http://schemas.openxmlformats.org/drawingml/2006/main" xmlns:r="http://schemas.openxmlformats.org/officeDocument/2006/relationships" xmlns:p="http://schemas.openxmlformats.org/presentationml/2006/main">
+  <p:cSld>
+    <p:spTree>
+      <p:nvGrpSpPr>
+        <p:cNvPr id="1" name=""/>
+        <p:cNvGrpSpPr/>
+        <p:nvPr/>
+      </p:nvGrpSpPr>
+      <p:grpSpPr>
+        <a:xfrm>
+          <a:off x="0" y="0"/>
+          <a:ext cx="0" cy="0"/>
+          <a:chOff x="0" y="0"/>
+          <a:chExt cx="0" cy="0"/>
+        </a:xfrm>
+      </p:grpSpPr>
+      <p:sp>
+        <p:nvSpPr>
+          <p:cNvPr id="2" name="Title 1">
+            <a:extLst>
+              <a:ext uri="{FF2B5EF4-FFF2-40B4-BE49-F238E27FC236}">
+                <a16:creationId xmlns:a16="http://schemas.microsoft.com/office/drawing/2014/main" id="{690A78C7-2E9E-456E-A6BE-D4866E269269}"/>
+              </a:ext>
+            </a:extLst>
+          </p:cNvPr>
+          <p:cNvSpPr>
+            <a:spLocks noGrp="1"/>
+          </p:cNvSpPr>
+          <p:nvPr>
+            <p:ph type="title"/>
+          </p:nvPr>
+        </p:nvSpPr>
+        <p:spPr/>
+        <p:txBody>
+          <a:bodyPr/>
+          <a:lstStyle/>
+          <a:p>
+            <a:endParaRPr lang="en-US"/>
+          </a:p>
+        </p:txBody>
+      </p:sp>
+      <p:sp>
+        <p:nvSpPr>
+          <p:cNvPr id="3" name="Content Placeholder 2">
+            <a:extLst>
+              <a:ext uri="{FF2B5EF4-FFF2-40B4-BE49-F238E27FC236}">
+                <a16:creationId xmlns:a16="http://schemas.microsoft.com/office/drawing/2014/main" id="{236C18CB-4F9C-44C8-B2A0-38B02F3B8739}"/>
+              </a:ext>
+            </a:extLst>
+          </p:cNvPr>
+          <p:cNvSpPr>
+            <a:spLocks noGrp="1"/>
+          </p:cNvSpPr>
+          <p:nvPr>
+            <p:ph idx="1"/>
+          </p:nvPr>
+        </p:nvSpPr>
+        <p:spPr/>
+        <p:txBody>
+          <a:bodyPr/>
+          <a:lstStyle/>
+          <a:p>
+            <a:endParaRPr lang="en-US"/>
+          </a:p>
+        </p:txBody>
+      </p:sp>
+    </p:spTree>
+    <p:extLst>
+      <p:ext uri="{BB962C8B-B14F-4D97-AF65-F5344CB8AC3E}">
+        <p14:creationId xmlns:p14="http://schemas.microsoft.com/office/powerpoint/2010/main" val="4114525933"/>
+      </p:ext>
+    </p:extLst>
+  </p:cSld>
+  <p:clrMapOvr>
+    <a:masterClrMapping/>
+  </p:clrMapOvr>
+  <p:transition>
+    <p:wipe/>
+  </p:transition>
+</p:sld>
+</file>
+
+<file path=ppt/slides/slide9.xml><?xml version="1.0" encoding="utf-8"?>
 <p:sld xmlns:a="http://schemas.openxmlformats.org/drawingml/2006/main" xmlns:r="http://schemas.openxmlformats.org/officeDocument/2006/relationships" xmlns:p="http://schemas.openxmlformats.org/presentationml/2006/main">
   <p:cSld>
     <p:spTree>
@@ -4105,180 +6080,6 @@
     <p:extLst>
       <p:ext uri="{BB962C8B-B14F-4D97-AF65-F5344CB8AC3E}">
         <p14:creationId xmlns:p14="http://schemas.microsoft.com/office/powerpoint/2010/main" val="266137470"/>
-      </p:ext>
-    </p:extLst>
-  </p:cSld>
-  <p:clrMapOvr>
-    <a:masterClrMapping/>
-  </p:clrMapOvr>
-  <p:transition>
-    <p:wipe/>
-  </p:transition>
-</p:sld>
-</file>
-
-<file path=ppt/slides/slide3.xml><?xml version="1.0" encoding="utf-8"?>
-<p:sld xmlns:a="http://schemas.openxmlformats.org/drawingml/2006/main" xmlns:r="http://schemas.openxmlformats.org/officeDocument/2006/relationships" xmlns:p="http://schemas.openxmlformats.org/presentationml/2006/main">
-  <p:cSld>
-    <p:spTree>
-      <p:nvGrpSpPr>
-        <p:cNvPr id="1" name=""/>
-        <p:cNvGrpSpPr/>
-        <p:nvPr/>
-      </p:nvGrpSpPr>
-      <p:grpSpPr>
-        <a:xfrm>
-          <a:off x="0" y="0"/>
-          <a:ext cx="0" cy="0"/>
-          <a:chOff x="0" y="0"/>
-          <a:chExt cx="0" cy="0"/>
-        </a:xfrm>
-      </p:grpSpPr>
-      <p:sp>
-        <p:nvSpPr>
-          <p:cNvPr id="2" name="Text Placeholder 1">
-            <a:extLst>
-              <a:ext uri="{FF2B5EF4-FFF2-40B4-BE49-F238E27FC236}">
-                <a16:creationId xmlns:a16="http://schemas.microsoft.com/office/drawing/2014/main" id="{B848A531-13BD-42AD-A332-33C02482A1C6}"/>
-              </a:ext>
-            </a:extLst>
-          </p:cNvPr>
-          <p:cNvSpPr>
-            <a:spLocks noGrp="1"/>
-          </p:cNvSpPr>
-          <p:nvPr>
-            <p:ph type="body" idx="1"/>
-          </p:nvPr>
-        </p:nvSpPr>
-        <p:spPr/>
-        <p:txBody>
-          <a:bodyPr/>
-          <a:lstStyle/>
-          <a:p>
-            <a:r>
-              <a:rPr lang="en-US"/>
-              <a:t>Resources</a:t>
-            </a:r>
-          </a:p>
-          <a:p>
-            <a:pPr lvl="1"/>
-            <a:r>
-              <a:rPr lang="en-US"/>
-              <a:t>Github: Source Code, White Paper and Slides</a:t>
-            </a:r>
-            <a:br>
-              <a:rPr lang="en-US"/>
-            </a:br>
-            <a:br>
-              <a:rPr lang="en-US" sz="500"/>
-            </a:br>
-            <a:r>
-              <a:rPr lang="en-US" sz="2000">
-                <a:hlinkClick r:id="rId2"/>
-              </a:rPr>
-              <a:t>https://github.com/RickStrahl/SWFOX2019_VueJs</a:t>
-            </a:r>
-            <a:br>
-              <a:rPr lang="en-US"/>
-            </a:br>
-            <a:endParaRPr lang="en-US"/>
-          </a:p>
-          <a:p>
-            <a:r>
-              <a:rPr lang="en-US"/>
-              <a:t>Contact Rick</a:t>
-            </a:r>
-          </a:p>
-          <a:p>
-            <a:pPr lvl="1"/>
-            <a:r>
-              <a:rPr lang="en-US" b="1">
-                <a:hlinkClick r:id="rId3"/>
-              </a:rPr>
-              <a:t>@RickStrahl</a:t>
-            </a:r>
-            <a:r>
-              <a:rPr lang="en-US" b="1"/>
-              <a:t>  on Twitter</a:t>
-            </a:r>
-          </a:p>
-          <a:p>
-            <a:pPr lvl="1"/>
-            <a:r>
-              <a:rPr lang="en-US" b="1">
-                <a:hlinkClick r:id="rId4"/>
-              </a:rPr>
-              <a:t>https://weblog.west-wind.com</a:t>
-            </a:r>
-            <a:endParaRPr lang="en-US" b="1"/>
-          </a:p>
-          <a:p>
-            <a:pPr lvl="1"/>
-            <a:r>
-              <a:rPr lang="en-US" b="1">
-                <a:hlinkClick r:id="rId5"/>
-              </a:rPr>
-              <a:t>https://west-wind.com/wconnect/weblog/</a:t>
-            </a:r>
-            <a:r>
-              <a:rPr lang="en-US" b="1"/>
-              <a:t> </a:t>
-            </a:r>
-          </a:p>
-          <a:p>
-            <a:pPr lvl="1"/>
-            <a:r>
-              <a:rPr lang="en-US" b="1">
-                <a:hlinkClick r:id="rId6"/>
-              </a:rPr>
-              <a:t>rstrahl@west-wind.com</a:t>
-            </a:r>
-            <a:r>
-              <a:rPr lang="en-US" b="1"/>
-              <a:t>	</a:t>
-            </a:r>
-            <a:endParaRPr lang="en-US"/>
-          </a:p>
-          <a:p>
-            <a:pPr marL="457200" lvl="1" indent="0">
-              <a:buNone/>
-            </a:pPr>
-            <a:endParaRPr lang="en-US"/>
-          </a:p>
-        </p:txBody>
-      </p:sp>
-      <p:sp>
-        <p:nvSpPr>
-          <p:cNvPr id="3" name="Title 2">
-            <a:extLst>
-              <a:ext uri="{FF2B5EF4-FFF2-40B4-BE49-F238E27FC236}">
-                <a16:creationId xmlns:a16="http://schemas.microsoft.com/office/drawing/2014/main" id="{DB285E1C-0327-484C-9555-5AF3541A05DD}"/>
-              </a:ext>
-            </a:extLst>
-          </p:cNvPr>
-          <p:cNvSpPr>
-            <a:spLocks noGrp="1"/>
-          </p:cNvSpPr>
-          <p:nvPr>
-            <p:ph type="title"/>
-          </p:nvPr>
-        </p:nvSpPr>
-        <p:spPr/>
-        <p:txBody>
-          <a:bodyPr/>
-          <a:lstStyle/>
-          <a:p>
-            <a:r>
-              <a:rPr lang="en-US"/>
-              <a:t>Thank you!</a:t>
-            </a:r>
-          </a:p>
-        </p:txBody>
-      </p:sp>
-    </p:spTree>
-    <p:extLst>
-      <p:ext uri="{BB962C8B-B14F-4D97-AF65-F5344CB8AC3E}">
-        <p14:creationId xmlns:p14="http://schemas.microsoft.com/office/powerpoint/2010/main" val="144676648"/>
       </p:ext>
     </p:extLst>
   </p:cSld>

</xml_diff>